<commit_message>
updated vision, data, and queries
</commit_message>
<xml_diff>
--- a/project/ERD.pptx
+++ b/project/ERD.pptx
@@ -112,6 +112,10 @@
 </p:presentation>
 </file>
 
+<file path=ppt/revisionInfo.xml><?xml version="1.0" encoding="utf-8"?>
+<p1510:revInfo xmlns:a="http://schemas.openxmlformats.org/drawingml/2006/main" xmlns:r="http://schemas.openxmlformats.org/officeDocument/2006/relationships" xmlns:p1510="http://schemas.microsoft.com/office/powerpoint/2015/10/main"/>
+</file>
+
 <file path=ppt/slideLayouts/slideLayout1.xml><?xml version="1.0" encoding="utf-8"?>
 <p:sldLayout xmlns:a="http://schemas.openxmlformats.org/drawingml/2006/main" xmlns:r="http://schemas.openxmlformats.org/officeDocument/2006/relationships" xmlns:p="http://schemas.openxmlformats.org/presentationml/2006/main" type="title" preserve="1">
   <p:cSld name="Title Slide">
@@ -241,7 +245,7 @@
           <a:p>
             <a:fld id="{845AE16D-E0C5-4C54-AE9D-314CFA4356E3}" type="datetimeFigureOut">
               <a:rPr lang="en-US" smtClean="0"/>
-              <a:t>3/2/2017</a:t>
+              <a:t>5/18/2017</a:t>
             </a:fld>
             <a:endParaRPr lang="en-US"/>
           </a:p>
@@ -409,7 +413,7 @@
           <a:p>
             <a:fld id="{845AE16D-E0C5-4C54-AE9D-314CFA4356E3}" type="datetimeFigureOut">
               <a:rPr lang="en-US" smtClean="0"/>
-              <a:t>3/2/2017</a:t>
+              <a:t>5/18/2017</a:t>
             </a:fld>
             <a:endParaRPr lang="en-US"/>
           </a:p>
@@ -587,7 +591,7 @@
           <a:p>
             <a:fld id="{845AE16D-E0C5-4C54-AE9D-314CFA4356E3}" type="datetimeFigureOut">
               <a:rPr lang="en-US" smtClean="0"/>
-              <a:t>3/2/2017</a:t>
+              <a:t>5/18/2017</a:t>
             </a:fld>
             <a:endParaRPr lang="en-US"/>
           </a:p>
@@ -755,7 +759,7 @@
           <a:p>
             <a:fld id="{845AE16D-E0C5-4C54-AE9D-314CFA4356E3}" type="datetimeFigureOut">
               <a:rPr lang="en-US" smtClean="0"/>
-              <a:t>3/2/2017</a:t>
+              <a:t>5/18/2017</a:t>
             </a:fld>
             <a:endParaRPr lang="en-US"/>
           </a:p>
@@ -1000,7 +1004,7 @@
           <a:p>
             <a:fld id="{845AE16D-E0C5-4C54-AE9D-314CFA4356E3}" type="datetimeFigureOut">
               <a:rPr lang="en-US" smtClean="0"/>
-              <a:t>3/2/2017</a:t>
+              <a:t>5/18/2017</a:t>
             </a:fld>
             <a:endParaRPr lang="en-US"/>
           </a:p>
@@ -1229,7 +1233,7 @@
           <a:p>
             <a:fld id="{845AE16D-E0C5-4C54-AE9D-314CFA4356E3}" type="datetimeFigureOut">
               <a:rPr lang="en-US" smtClean="0"/>
-              <a:t>3/2/2017</a:t>
+              <a:t>5/18/2017</a:t>
             </a:fld>
             <a:endParaRPr lang="en-US"/>
           </a:p>
@@ -1593,7 +1597,7 @@
           <a:p>
             <a:fld id="{845AE16D-E0C5-4C54-AE9D-314CFA4356E3}" type="datetimeFigureOut">
               <a:rPr lang="en-US" smtClean="0"/>
-              <a:t>3/2/2017</a:t>
+              <a:t>5/18/2017</a:t>
             </a:fld>
             <a:endParaRPr lang="en-US"/>
           </a:p>
@@ -1710,7 +1714,7 @@
           <a:p>
             <a:fld id="{845AE16D-E0C5-4C54-AE9D-314CFA4356E3}" type="datetimeFigureOut">
               <a:rPr lang="en-US" smtClean="0"/>
-              <a:t>3/2/2017</a:t>
+              <a:t>5/18/2017</a:t>
             </a:fld>
             <a:endParaRPr lang="en-US"/>
           </a:p>
@@ -1805,7 +1809,7 @@
           <a:p>
             <a:fld id="{845AE16D-E0C5-4C54-AE9D-314CFA4356E3}" type="datetimeFigureOut">
               <a:rPr lang="en-US" smtClean="0"/>
-              <a:t>3/2/2017</a:t>
+              <a:t>5/18/2017</a:t>
             </a:fld>
             <a:endParaRPr lang="en-US"/>
           </a:p>
@@ -2080,7 +2084,7 @@
           <a:p>
             <a:fld id="{845AE16D-E0C5-4C54-AE9D-314CFA4356E3}" type="datetimeFigureOut">
               <a:rPr lang="en-US" smtClean="0"/>
-              <a:t>3/2/2017</a:t>
+              <a:t>5/18/2017</a:t>
             </a:fld>
             <a:endParaRPr lang="en-US"/>
           </a:p>
@@ -2332,7 +2336,7 @@
           <a:p>
             <a:fld id="{845AE16D-E0C5-4C54-AE9D-314CFA4356E3}" type="datetimeFigureOut">
               <a:rPr lang="en-US" smtClean="0"/>
-              <a:t>3/2/2017</a:t>
+              <a:t>5/18/2017</a:t>
             </a:fld>
             <a:endParaRPr lang="en-US"/>
           </a:p>
@@ -2543,7 +2547,7 @@
           <a:p>
             <a:fld id="{845AE16D-E0C5-4C54-AE9D-314CFA4356E3}" type="datetimeFigureOut">
               <a:rPr lang="en-US" smtClean="0"/>
-              <a:t>3/2/2017</a:t>
+              <a:t>5/18/2017</a:t>
             </a:fld>
             <a:endParaRPr lang="en-US"/>
           </a:p>
@@ -2986,7 +2990,7 @@
             <a:pPr algn="ctr"/>
             <a:r>
               <a:rPr lang="en-US" dirty="0"/>
-              <a:t>Brand</a:t>
+              <a:t>Parent Company</a:t>
             </a:r>
           </a:p>
         </p:txBody>
@@ -4425,7 +4429,7 @@
         </p:nvSpPr>
         <p:spPr>
           <a:xfrm>
-            <a:off x="10517695" y="3226056"/>
+            <a:off x="10500919" y="3571181"/>
             <a:ext cx="918594" cy="453005"/>
           </a:xfrm>
           <a:prstGeom prst="ellipse">
@@ -4474,7 +4478,7 @@
         </p:nvSpPr>
         <p:spPr>
           <a:xfrm>
-            <a:off x="10501441" y="2659739"/>
+            <a:off x="10509308" y="3035767"/>
             <a:ext cx="918594" cy="453005"/>
           </a:xfrm>
           <a:prstGeom prst="ellipse">
@@ -4523,7 +4527,7 @@
         </p:nvSpPr>
         <p:spPr>
           <a:xfrm>
-            <a:off x="10501440" y="3810003"/>
+            <a:off x="10501441" y="4121869"/>
             <a:ext cx="918594" cy="453005"/>
           </a:xfrm>
           <a:prstGeom prst="ellipse">
@@ -4572,7 +4576,7 @@
         </p:nvSpPr>
         <p:spPr>
           <a:xfrm>
-            <a:off x="8124734" y="6047753"/>
+            <a:off x="8609200" y="6166304"/>
             <a:ext cx="918594" cy="453005"/>
           </a:xfrm>
           <a:prstGeom prst="ellipse">
@@ -4670,7 +4674,7 @@
         </p:nvSpPr>
         <p:spPr>
           <a:xfrm>
-            <a:off x="9192930" y="5908988"/>
+            <a:off x="9520593" y="5939802"/>
             <a:ext cx="918594" cy="453005"/>
           </a:xfrm>
           <a:prstGeom prst="ellipse">
@@ -5181,8 +5185,8 @@
         </p:nvCxnSpPr>
         <p:spPr>
           <a:xfrm flipH="1">
-            <a:off x="9387280" y="2886242"/>
-            <a:ext cx="1114161" cy="568972"/>
+            <a:off x="9387280" y="3262270"/>
+            <a:ext cx="1122028" cy="192944"/>
           </a:xfrm>
           <a:prstGeom prst="line">
             <a:avLst/>
@@ -5213,9 +5217,9 @@
           <p:nvPr/>
         </p:nvCxnSpPr>
         <p:spPr>
-          <a:xfrm flipH="1">
-            <a:off x="9387280" y="3452559"/>
-            <a:ext cx="1130415" cy="2655"/>
+          <a:xfrm flipH="1" flipV="1">
+            <a:off x="9387280" y="3455214"/>
+            <a:ext cx="1113639" cy="342470"/>
           </a:xfrm>
           <a:prstGeom prst="line">
             <a:avLst/>
@@ -5248,7 +5252,7 @@
         <p:spPr>
           <a:xfrm flipH="1" flipV="1">
             <a:off x="9387280" y="3455214"/>
-            <a:ext cx="1114160" cy="581292"/>
+            <a:ext cx="1114161" cy="893158"/>
           </a:xfrm>
           <a:prstGeom prst="line">
             <a:avLst/>
@@ -5314,7 +5318,7 @@
         <p:spPr>
           <a:xfrm flipH="1" flipV="1">
             <a:off x="8753911" y="5471017"/>
-            <a:ext cx="898316" cy="437971"/>
+            <a:ext cx="1225979" cy="468785"/>
           </a:xfrm>
           <a:prstGeom prst="line">
             <a:avLst/>
@@ -5345,9 +5349,9 @@
           <p:nvPr/>
         </p:nvCxnSpPr>
         <p:spPr>
-          <a:xfrm flipV="1">
-            <a:off x="8584031" y="5471017"/>
-            <a:ext cx="169880" cy="576736"/>
+          <a:xfrm flipH="1" flipV="1">
+            <a:off x="8753911" y="5471017"/>
+            <a:ext cx="314586" cy="695287"/>
           </a:xfrm>
           <a:prstGeom prst="line">
             <a:avLst/>
@@ -5765,6 +5769,497 @@
           <a:xfrm flipV="1">
             <a:off x="9387280" y="5132799"/>
             <a:ext cx="997190" cy="61382"/>
+          </a:xfrm>
+          <a:prstGeom prst="line">
+            <a:avLst/>
+          </a:prstGeom>
+        </p:spPr>
+        <p:style>
+          <a:lnRef idx="1">
+            <a:schemeClr val="accent1"/>
+          </a:lnRef>
+          <a:fillRef idx="0">
+            <a:schemeClr val="accent1"/>
+          </a:fillRef>
+          <a:effectRef idx="0">
+            <a:schemeClr val="accent1"/>
+          </a:effectRef>
+          <a:fontRef idx="minor">
+            <a:schemeClr val="tx1"/>
+          </a:fontRef>
+        </p:style>
+      </p:cxnSp>
+      <p:sp>
+        <p:nvSpPr>
+          <p:cNvPr id="81" name="Oval 80"/>
+          <p:cNvSpPr/>
+          <p:nvPr/>
+        </p:nvSpPr>
+        <p:spPr>
+          <a:xfrm>
+            <a:off x="977317" y="2670843"/>
+            <a:ext cx="918594" cy="453005"/>
+          </a:xfrm>
+          <a:prstGeom prst="ellipse">
+            <a:avLst/>
+          </a:prstGeom>
+          <a:solidFill>
+            <a:schemeClr val="accent6">
+              <a:lumMod val="60000"/>
+              <a:lumOff val="40000"/>
+            </a:schemeClr>
+          </a:solidFill>
+        </p:spPr>
+        <p:style>
+          <a:lnRef idx="2">
+            <a:schemeClr val="accent6">
+              <a:shade val="50000"/>
+            </a:schemeClr>
+          </a:lnRef>
+          <a:fillRef idx="1">
+            <a:schemeClr val="accent6"/>
+          </a:fillRef>
+          <a:effectRef idx="0">
+            <a:schemeClr val="accent6"/>
+          </a:effectRef>
+          <a:fontRef idx="minor">
+            <a:schemeClr val="lt1"/>
+          </a:fontRef>
+        </p:style>
+        <p:txBody>
+          <a:bodyPr rtlCol="0" anchor="ctr"/>
+          <a:lstStyle/>
+          <a:p>
+            <a:pPr algn="ctr"/>
+            <a:r>
+              <a:rPr lang="en-US" sz="1000" u="sng" dirty="0"/>
+              <a:t>ID</a:t>
+            </a:r>
+          </a:p>
+        </p:txBody>
+      </p:sp>
+      <p:sp>
+        <p:nvSpPr>
+          <p:cNvPr id="84" name="Oval 83"/>
+          <p:cNvSpPr/>
+          <p:nvPr/>
+        </p:nvSpPr>
+        <p:spPr>
+          <a:xfrm>
+            <a:off x="9644499" y="1020908"/>
+            <a:ext cx="918594" cy="453005"/>
+          </a:xfrm>
+          <a:prstGeom prst="ellipse">
+            <a:avLst/>
+          </a:prstGeom>
+          <a:solidFill>
+            <a:schemeClr val="accent6">
+              <a:lumMod val="60000"/>
+              <a:lumOff val="40000"/>
+            </a:schemeClr>
+          </a:solidFill>
+        </p:spPr>
+        <p:style>
+          <a:lnRef idx="2">
+            <a:schemeClr val="accent6">
+              <a:shade val="50000"/>
+            </a:schemeClr>
+          </a:lnRef>
+          <a:fillRef idx="1">
+            <a:schemeClr val="accent6"/>
+          </a:fillRef>
+          <a:effectRef idx="0">
+            <a:schemeClr val="accent6"/>
+          </a:effectRef>
+          <a:fontRef idx="minor">
+            <a:schemeClr val="lt1"/>
+          </a:fontRef>
+        </p:style>
+        <p:txBody>
+          <a:bodyPr rtlCol="0" anchor="ctr"/>
+          <a:lstStyle/>
+          <a:p>
+            <a:pPr algn="ctr"/>
+            <a:r>
+              <a:rPr lang="en-US" sz="1000" u="sng" dirty="0"/>
+              <a:t>ID</a:t>
+            </a:r>
+          </a:p>
+        </p:txBody>
+      </p:sp>
+      <p:sp>
+        <p:nvSpPr>
+          <p:cNvPr id="86" name="Oval 85"/>
+          <p:cNvSpPr/>
+          <p:nvPr/>
+        </p:nvSpPr>
+        <p:spPr>
+          <a:xfrm>
+            <a:off x="10496375" y="2470257"/>
+            <a:ext cx="918594" cy="453005"/>
+          </a:xfrm>
+          <a:prstGeom prst="ellipse">
+            <a:avLst/>
+          </a:prstGeom>
+          <a:solidFill>
+            <a:schemeClr val="accent6">
+              <a:lumMod val="60000"/>
+              <a:lumOff val="40000"/>
+            </a:schemeClr>
+          </a:solidFill>
+        </p:spPr>
+        <p:style>
+          <a:lnRef idx="2">
+            <a:schemeClr val="accent6">
+              <a:shade val="50000"/>
+            </a:schemeClr>
+          </a:lnRef>
+          <a:fillRef idx="1">
+            <a:schemeClr val="accent6"/>
+          </a:fillRef>
+          <a:effectRef idx="0">
+            <a:schemeClr val="accent6"/>
+          </a:effectRef>
+          <a:fontRef idx="minor">
+            <a:schemeClr val="lt1"/>
+          </a:fontRef>
+        </p:style>
+        <p:txBody>
+          <a:bodyPr rtlCol="0" anchor="ctr"/>
+          <a:lstStyle/>
+          <a:p>
+            <a:pPr algn="ctr"/>
+            <a:r>
+              <a:rPr lang="en-US" sz="1000" u="sng" dirty="0"/>
+              <a:t>ID</a:t>
+            </a:r>
+          </a:p>
+        </p:txBody>
+      </p:sp>
+      <p:cxnSp>
+        <p:nvCxnSpPr>
+          <p:cNvPr id="20" name="Straight Connector 19"/>
+          <p:cNvCxnSpPr>
+            <a:stCxn id="86" idx="2"/>
+            <a:endCxn id="37" idx="3"/>
+          </p:cNvCxnSpPr>
+          <p:nvPr/>
+        </p:nvCxnSpPr>
+        <p:spPr>
+          <a:xfrm flipH="1">
+            <a:off x="9387280" y="2696760"/>
+            <a:ext cx="1109095" cy="758454"/>
+          </a:xfrm>
+          <a:prstGeom prst="line">
+            <a:avLst/>
+          </a:prstGeom>
+        </p:spPr>
+        <p:style>
+          <a:lnRef idx="1">
+            <a:schemeClr val="accent1"/>
+          </a:lnRef>
+          <a:fillRef idx="0">
+            <a:schemeClr val="accent1"/>
+          </a:fillRef>
+          <a:effectRef idx="0">
+            <a:schemeClr val="accent1"/>
+          </a:effectRef>
+          <a:fontRef idx="minor">
+            <a:schemeClr val="tx1"/>
+          </a:fontRef>
+        </p:style>
+      </p:cxnSp>
+      <p:sp>
+        <p:nvSpPr>
+          <p:cNvPr id="88" name="Oval 87"/>
+          <p:cNvSpPr/>
+          <p:nvPr/>
+        </p:nvSpPr>
+        <p:spPr>
+          <a:xfrm>
+            <a:off x="7609269" y="6166304"/>
+            <a:ext cx="918594" cy="453005"/>
+          </a:xfrm>
+          <a:prstGeom prst="ellipse">
+            <a:avLst/>
+          </a:prstGeom>
+          <a:solidFill>
+            <a:schemeClr val="accent6">
+              <a:lumMod val="60000"/>
+              <a:lumOff val="40000"/>
+            </a:schemeClr>
+          </a:solidFill>
+        </p:spPr>
+        <p:style>
+          <a:lnRef idx="2">
+            <a:schemeClr val="accent6">
+              <a:shade val="50000"/>
+            </a:schemeClr>
+          </a:lnRef>
+          <a:fillRef idx="1">
+            <a:schemeClr val="accent6"/>
+          </a:fillRef>
+          <a:effectRef idx="0">
+            <a:schemeClr val="accent6"/>
+          </a:effectRef>
+          <a:fontRef idx="minor">
+            <a:schemeClr val="lt1"/>
+          </a:fontRef>
+        </p:style>
+        <p:txBody>
+          <a:bodyPr rtlCol="0" anchor="ctr"/>
+          <a:lstStyle/>
+          <a:p>
+            <a:pPr algn="ctr"/>
+            <a:r>
+              <a:rPr lang="en-US" sz="1000" u="sng" dirty="0"/>
+              <a:t>ID</a:t>
+            </a:r>
+          </a:p>
+        </p:txBody>
+      </p:sp>
+      <p:cxnSp>
+        <p:nvCxnSpPr>
+          <p:cNvPr id="29" name="Straight Connector 28"/>
+          <p:cNvCxnSpPr>
+            <a:stCxn id="88" idx="0"/>
+            <a:endCxn id="7" idx="2"/>
+          </p:cNvCxnSpPr>
+          <p:nvPr/>
+        </p:nvCxnSpPr>
+        <p:spPr>
+          <a:xfrm flipV="1">
+            <a:off x="8068566" y="5471017"/>
+            <a:ext cx="685345" cy="695287"/>
+          </a:xfrm>
+          <a:prstGeom prst="line">
+            <a:avLst/>
+          </a:prstGeom>
+        </p:spPr>
+        <p:style>
+          <a:lnRef idx="1">
+            <a:schemeClr val="accent1"/>
+          </a:lnRef>
+          <a:fillRef idx="0">
+            <a:schemeClr val="accent1"/>
+          </a:fillRef>
+          <a:effectRef idx="0">
+            <a:schemeClr val="accent1"/>
+          </a:effectRef>
+          <a:fontRef idx="minor">
+            <a:schemeClr val="tx1"/>
+          </a:fontRef>
+        </p:style>
+      </p:cxnSp>
+      <p:sp>
+        <p:nvSpPr>
+          <p:cNvPr id="90" name="Oval 89"/>
+          <p:cNvSpPr/>
+          <p:nvPr/>
+        </p:nvSpPr>
+        <p:spPr>
+          <a:xfrm>
+            <a:off x="3550633" y="5839425"/>
+            <a:ext cx="918594" cy="453005"/>
+          </a:xfrm>
+          <a:prstGeom prst="ellipse">
+            <a:avLst/>
+          </a:prstGeom>
+          <a:solidFill>
+            <a:schemeClr val="accent6">
+              <a:lumMod val="60000"/>
+              <a:lumOff val="40000"/>
+            </a:schemeClr>
+          </a:solidFill>
+        </p:spPr>
+        <p:style>
+          <a:lnRef idx="2">
+            <a:schemeClr val="accent6">
+              <a:shade val="50000"/>
+            </a:schemeClr>
+          </a:lnRef>
+          <a:fillRef idx="1">
+            <a:schemeClr val="accent6"/>
+          </a:fillRef>
+          <a:effectRef idx="0">
+            <a:schemeClr val="accent6"/>
+          </a:effectRef>
+          <a:fontRef idx="minor">
+            <a:schemeClr val="lt1"/>
+          </a:fontRef>
+        </p:style>
+        <p:txBody>
+          <a:bodyPr rtlCol="0" anchor="ctr"/>
+          <a:lstStyle/>
+          <a:p>
+            <a:pPr algn="ctr"/>
+            <a:r>
+              <a:rPr lang="en-US" sz="1000" u="sng" dirty="0"/>
+              <a:t>ID</a:t>
+            </a:r>
+          </a:p>
+        </p:txBody>
+      </p:sp>
+      <p:cxnSp>
+        <p:nvCxnSpPr>
+          <p:cNvPr id="33" name="Straight Connector 32"/>
+          <p:cNvCxnSpPr>
+            <a:stCxn id="90" idx="0"/>
+          </p:cNvCxnSpPr>
+          <p:nvPr/>
+        </p:nvCxnSpPr>
+        <p:spPr>
+          <a:xfrm flipV="1">
+            <a:off x="4009930" y="4217920"/>
+            <a:ext cx="1861446" cy="1621505"/>
+          </a:xfrm>
+          <a:prstGeom prst="line">
+            <a:avLst/>
+          </a:prstGeom>
+        </p:spPr>
+        <p:style>
+          <a:lnRef idx="1">
+            <a:schemeClr val="accent1"/>
+          </a:lnRef>
+          <a:fillRef idx="0">
+            <a:schemeClr val="accent1"/>
+          </a:fillRef>
+          <a:effectRef idx="0">
+            <a:schemeClr val="accent1"/>
+          </a:effectRef>
+          <a:fontRef idx="minor">
+            <a:schemeClr val="tx1"/>
+          </a:fontRef>
+        </p:style>
+      </p:cxnSp>
+      <p:sp>
+        <p:nvSpPr>
+          <p:cNvPr id="92" name="Oval 91"/>
+          <p:cNvSpPr/>
+          <p:nvPr/>
+        </p:nvSpPr>
+        <p:spPr>
+          <a:xfrm>
+            <a:off x="630970" y="4936987"/>
+            <a:ext cx="918594" cy="453005"/>
+          </a:xfrm>
+          <a:prstGeom prst="ellipse">
+            <a:avLst/>
+          </a:prstGeom>
+          <a:solidFill>
+            <a:schemeClr val="accent6">
+              <a:lumMod val="60000"/>
+              <a:lumOff val="40000"/>
+            </a:schemeClr>
+          </a:solidFill>
+        </p:spPr>
+        <p:style>
+          <a:lnRef idx="2">
+            <a:schemeClr val="accent6">
+              <a:shade val="50000"/>
+            </a:schemeClr>
+          </a:lnRef>
+          <a:fillRef idx="1">
+            <a:schemeClr val="accent6"/>
+          </a:fillRef>
+          <a:effectRef idx="0">
+            <a:schemeClr val="accent6"/>
+          </a:effectRef>
+          <a:fontRef idx="minor">
+            <a:schemeClr val="lt1"/>
+          </a:fontRef>
+        </p:style>
+        <p:txBody>
+          <a:bodyPr rtlCol="0" anchor="ctr"/>
+          <a:lstStyle/>
+          <a:p>
+            <a:pPr algn="ctr"/>
+            <a:r>
+              <a:rPr lang="en-US" sz="1000" u="sng" dirty="0"/>
+              <a:t>ID</a:t>
+            </a:r>
+          </a:p>
+        </p:txBody>
+      </p:sp>
+      <p:cxnSp>
+        <p:nvCxnSpPr>
+          <p:cNvPr id="35" name="Straight Connector 34"/>
+          <p:cNvCxnSpPr>
+            <a:stCxn id="92" idx="6"/>
+            <a:endCxn id="8" idx="1"/>
+          </p:cNvCxnSpPr>
+          <p:nvPr/>
+        </p:nvCxnSpPr>
+        <p:spPr>
+          <a:xfrm>
+            <a:off x="1549564" y="5163490"/>
+            <a:ext cx="891632" cy="30692"/>
+          </a:xfrm>
+          <a:prstGeom prst="line">
+            <a:avLst/>
+          </a:prstGeom>
+        </p:spPr>
+        <p:style>
+          <a:lnRef idx="1">
+            <a:schemeClr val="accent1"/>
+          </a:lnRef>
+          <a:fillRef idx="0">
+            <a:schemeClr val="accent1"/>
+          </a:fillRef>
+          <a:effectRef idx="0">
+            <a:schemeClr val="accent1"/>
+          </a:effectRef>
+          <a:fontRef idx="minor">
+            <a:schemeClr val="tx1"/>
+          </a:fontRef>
+        </p:style>
+      </p:cxnSp>
+      <p:cxnSp>
+        <p:nvCxnSpPr>
+          <p:cNvPr id="39" name="Straight Connector 38"/>
+          <p:cNvCxnSpPr>
+            <a:stCxn id="4" idx="0"/>
+            <a:endCxn id="84" idx="2"/>
+          </p:cNvCxnSpPr>
+          <p:nvPr/>
+        </p:nvCxnSpPr>
+        <p:spPr>
+          <a:xfrm flipV="1">
+            <a:off x="8753911" y="1247411"/>
+            <a:ext cx="890588" cy="192000"/>
+          </a:xfrm>
+          <a:prstGeom prst="line">
+            <a:avLst/>
+          </a:prstGeom>
+        </p:spPr>
+        <p:style>
+          <a:lnRef idx="1">
+            <a:schemeClr val="accent1"/>
+          </a:lnRef>
+          <a:fillRef idx="0">
+            <a:schemeClr val="accent1"/>
+          </a:fillRef>
+          <a:effectRef idx="0">
+            <a:schemeClr val="accent1"/>
+          </a:effectRef>
+          <a:fontRef idx="minor">
+            <a:schemeClr val="tx1"/>
+          </a:fontRef>
+        </p:style>
+      </p:cxnSp>
+      <p:cxnSp>
+        <p:nvCxnSpPr>
+          <p:cNvPr id="41" name="Straight Connector 40"/>
+          <p:cNvCxnSpPr>
+            <a:stCxn id="81" idx="7"/>
+            <a:endCxn id="6" idx="1"/>
+          </p:cNvCxnSpPr>
+          <p:nvPr/>
+        </p:nvCxnSpPr>
+        <p:spPr>
+          <a:xfrm flipV="1">
+            <a:off x="1761386" y="1716248"/>
+            <a:ext cx="679810" cy="1020936"/>
           </a:xfrm>
           <a:prstGeom prst="line">
             <a:avLst/>

</xml_diff>